<commit_message>
new experiments. adding to presentation
</commit_message>
<xml_diff>
--- a/presentations/powerpoint_presentation/my_presentation.pptx
+++ b/presentations/powerpoint_presentation/my_presentation.pptx
@@ -5,7 +5,7 @@
     <p:sldMasterId id="2147483648" r:id="rId1"/>
   </p:sldMasterIdLst>
   <p:notesMasterIdLst>
-    <p:notesMasterId r:id="rId17"/>
+    <p:notesMasterId r:id="rId18"/>
   </p:notesMasterIdLst>
   <p:sldIdLst>
     <p:sldId id="256" r:id="rId2"/>
@@ -21,8 +21,9 @@
     <p:sldId id="269" r:id="rId12"/>
     <p:sldId id="270" r:id="rId13"/>
     <p:sldId id="265" r:id="rId14"/>
-    <p:sldId id="263" r:id="rId15"/>
-    <p:sldId id="262" r:id="rId16"/>
+    <p:sldId id="271" r:id="rId15"/>
+    <p:sldId id="263" r:id="rId16"/>
+    <p:sldId id="262" r:id="rId17"/>
   </p:sldIdLst>
   <p:sldSz cx="12192000" cy="6858000"/>
   <p:notesSz cx="6858000" cy="9144000"/>
@@ -159,6 +160,7 @@
         <p14:section name="Further Work" id="{2C68A18E-9AB7-40C6-9425-61B235835F26}">
           <p14:sldIdLst>
             <p14:sldId id="265"/>
+            <p14:sldId id="271"/>
             <p14:sldId id="263"/>
           </p14:sldIdLst>
         </p14:section>
@@ -581,12 +583,6 @@
           <a:bodyPr/>
           <a:lstStyle/>
           <a:p>
-            <a:r>
-              <a:rPr lang="en-US" dirty="0"/>
-              <a:t>Aim &amp; Obj need to be written better</a:t>
-            </a:r>
-          </a:p>
-          <a:p>
             <a:endParaRPr lang="en-GB" dirty="0"/>
           </a:p>
         </p:txBody>
@@ -673,8 +669,16 @@
           <a:p>
             <a:r>
               <a:rPr lang="en-US" dirty="0"/>
-              <a:t>Cox PH is fitted by max partial likelihood</a:t>
-            </a:r>
+              <a:t>1. Cox PH is fitted by max partial likelihood.</a:t>
+            </a:r>
+          </a:p>
+          <a:p>
+            <a:r>
+              <a:rPr lang="en-US" dirty="0"/>
+              <a:t>2. DL – data-hungry, advent of EHR great! Longitudinal data</a:t>
+            </a:r>
+          </a:p>
+          <a:p>
             <a:endParaRPr lang="en-GB" dirty="0"/>
           </a:p>
         </p:txBody>
@@ -7863,6 +7867,49 @@
           </a:p>
         </p:txBody>
       </p:sp>
+      <p:sp>
+        <p:nvSpPr>
+          <p:cNvPr id="6" name="TextBox 5">
+            <a:extLst>
+              <a:ext uri="{FF2B5EF4-FFF2-40B4-BE49-F238E27FC236}">
+                <a16:creationId xmlns:a16="http://schemas.microsoft.com/office/drawing/2014/main" id="{3CCCE15F-658A-7E1E-F850-8C113A3C65D2}"/>
+              </a:ext>
+            </a:extLst>
+          </p:cNvPr>
+          <p:cNvSpPr txBox="1"/>
+          <p:nvPr/>
+        </p:nvSpPr>
+        <p:spPr>
+          <a:xfrm>
+            <a:off x="7455493" y="122255"/>
+            <a:ext cx="4736507" cy="261610"/>
+          </a:xfrm>
+          <a:prstGeom prst="rect">
+            <a:avLst/>
+          </a:prstGeom>
+          <a:noFill/>
+        </p:spPr>
+        <p:txBody>
+          <a:bodyPr wrap="square">
+            <a:spAutoFit/>
+          </a:bodyPr>
+          <a:lstStyle/>
+          <a:p>
+            <a:pPr algn="ctr"/>
+            <a:r>
+              <a:rPr lang="en-US" sz="1100" dirty="0">
+                <a:solidFill>
+                  <a:schemeClr val="bg1">
+                    <a:lumMod val="50000"/>
+                  </a:schemeClr>
+                </a:solidFill>
+                <a:latin typeface="Bookman Old Style" panose="02050604050505020204" pitchFamily="18" charset="0"/>
+              </a:rPr>
+              <a:t>Results are subject to slight change in final submission of report</a:t>
+            </a:r>
+          </a:p>
+        </p:txBody>
+      </p:sp>
     </p:spTree>
     <p:extLst>
       <p:ext uri="{BB962C8B-B14F-4D97-AF65-F5344CB8AC3E}">
@@ -8545,6 +8592,49 @@
           </a:p>
         </p:txBody>
       </p:sp>
+      <p:sp>
+        <p:nvSpPr>
+          <p:cNvPr id="4" name="TextBox 3">
+            <a:extLst>
+              <a:ext uri="{FF2B5EF4-FFF2-40B4-BE49-F238E27FC236}">
+                <a16:creationId xmlns:a16="http://schemas.microsoft.com/office/drawing/2014/main" id="{CDDEB2DC-E7ED-C3AE-2248-2642446A1E13}"/>
+              </a:ext>
+            </a:extLst>
+          </p:cNvPr>
+          <p:cNvSpPr txBox="1"/>
+          <p:nvPr/>
+        </p:nvSpPr>
+        <p:spPr>
+          <a:xfrm>
+            <a:off x="7455493" y="122255"/>
+            <a:ext cx="4736507" cy="261610"/>
+          </a:xfrm>
+          <a:prstGeom prst="rect">
+            <a:avLst/>
+          </a:prstGeom>
+          <a:noFill/>
+        </p:spPr>
+        <p:txBody>
+          <a:bodyPr wrap="square">
+            <a:spAutoFit/>
+          </a:bodyPr>
+          <a:lstStyle/>
+          <a:p>
+            <a:pPr algn="ctr"/>
+            <a:r>
+              <a:rPr lang="en-US" sz="1100" dirty="0">
+                <a:solidFill>
+                  <a:schemeClr val="bg1">
+                    <a:lumMod val="50000"/>
+                  </a:schemeClr>
+                </a:solidFill>
+                <a:latin typeface="Bookman Old Style" panose="02050604050505020204" pitchFamily="18" charset="0"/>
+              </a:rPr>
+              <a:t>Results are subject to slight change in final submission of report</a:t>
+            </a:r>
+          </a:p>
+        </p:txBody>
+      </p:sp>
     </p:spTree>
     <p:extLst>
       <p:ext uri="{BB962C8B-B14F-4D97-AF65-F5344CB8AC3E}">
@@ -8689,6 +8779,49 @@
               </a:solidFill>
               <a:latin typeface="Bookman Old Style" panose="02050604050505020204" pitchFamily="18" charset="0"/>
             </a:endParaRPr>
+          </a:p>
+        </p:txBody>
+      </p:sp>
+      <p:sp>
+        <p:nvSpPr>
+          <p:cNvPr id="2" name="TextBox 1">
+            <a:extLst>
+              <a:ext uri="{FF2B5EF4-FFF2-40B4-BE49-F238E27FC236}">
+                <a16:creationId xmlns:a16="http://schemas.microsoft.com/office/drawing/2014/main" id="{A4E4A43E-863D-6E6A-5A20-B2F851AAF2FD}"/>
+              </a:ext>
+            </a:extLst>
+          </p:cNvPr>
+          <p:cNvSpPr txBox="1"/>
+          <p:nvPr/>
+        </p:nvSpPr>
+        <p:spPr>
+          <a:xfrm>
+            <a:off x="7455493" y="122255"/>
+            <a:ext cx="4736507" cy="261610"/>
+          </a:xfrm>
+          <a:prstGeom prst="rect">
+            <a:avLst/>
+          </a:prstGeom>
+          <a:noFill/>
+        </p:spPr>
+        <p:txBody>
+          <a:bodyPr wrap="square">
+            <a:spAutoFit/>
+          </a:bodyPr>
+          <a:lstStyle/>
+          <a:p>
+            <a:pPr algn="ctr"/>
+            <a:r>
+              <a:rPr lang="en-US" sz="1100" dirty="0">
+                <a:solidFill>
+                  <a:schemeClr val="bg1">
+                    <a:lumMod val="50000"/>
+                  </a:schemeClr>
+                </a:solidFill>
+                <a:latin typeface="Bookman Old Style" panose="02050604050505020204" pitchFamily="18" charset="0"/>
+              </a:rPr>
+              <a:t>Results are subject to slight change in final submission of report</a:t>
+            </a:r>
           </a:p>
         </p:txBody>
       </p:sp>
@@ -9251,6 +9384,478 @@
                 </a:solidFill>
                 <a:latin typeface="Bookman Old Style" panose="02050604050505020204" pitchFamily="18" charset="0"/>
               </a:rPr>
+              <a:t>Discussion</a:t>
+            </a:r>
+          </a:p>
+        </p:txBody>
+      </p:sp>
+      <p:cxnSp>
+        <p:nvCxnSpPr>
+          <p:cNvPr id="4" name="Straight Connector 3">
+            <a:extLst>
+              <a:ext uri="{FF2B5EF4-FFF2-40B4-BE49-F238E27FC236}">
+                <a16:creationId xmlns:a16="http://schemas.microsoft.com/office/drawing/2014/main" id="{2F6BEED8-228E-A349-F419-5217F2A346CA}"/>
+              </a:ext>
+            </a:extLst>
+          </p:cNvPr>
+          <p:cNvCxnSpPr>
+            <a:cxnSpLocks/>
+          </p:cNvCxnSpPr>
+          <p:nvPr/>
+        </p:nvCxnSpPr>
+        <p:spPr>
+          <a:xfrm>
+            <a:off x="658894" y="5971922"/>
+            <a:ext cx="10923506" cy="0"/>
+          </a:xfrm>
+          <a:prstGeom prst="line">
+            <a:avLst/>
+          </a:prstGeom>
+          <a:ln>
+            <a:solidFill>
+              <a:schemeClr val="bg1"/>
+            </a:solidFill>
+          </a:ln>
+        </p:spPr>
+        <p:style>
+          <a:lnRef idx="1">
+            <a:schemeClr val="accent1"/>
+          </a:lnRef>
+          <a:fillRef idx="0">
+            <a:schemeClr val="accent1"/>
+          </a:fillRef>
+          <a:effectRef idx="0">
+            <a:schemeClr val="accent1"/>
+          </a:effectRef>
+          <a:fontRef idx="minor">
+            <a:schemeClr val="tx1"/>
+          </a:fontRef>
+        </p:style>
+      </p:cxnSp>
+      <p:sp>
+        <p:nvSpPr>
+          <p:cNvPr id="5" name="TextBox 4">
+            <a:extLst>
+              <a:ext uri="{FF2B5EF4-FFF2-40B4-BE49-F238E27FC236}">
+                <a16:creationId xmlns:a16="http://schemas.microsoft.com/office/drawing/2014/main" id="{03082D74-E05F-69E4-5AD3-1FB785A52B09}"/>
+              </a:ext>
+            </a:extLst>
+          </p:cNvPr>
+          <p:cNvSpPr txBox="1"/>
+          <p:nvPr/>
+        </p:nvSpPr>
+        <p:spPr>
+          <a:xfrm>
+            <a:off x="547141" y="5971921"/>
+            <a:ext cx="11035259" cy="400110"/>
+          </a:xfrm>
+          <a:prstGeom prst="rect">
+            <a:avLst/>
+          </a:prstGeom>
+          <a:noFill/>
+        </p:spPr>
+        <p:txBody>
+          <a:bodyPr wrap="square" rtlCol="0">
+            <a:spAutoFit/>
+          </a:bodyPr>
+          <a:lstStyle/>
+          <a:p>
+            <a:pPr algn="just"/>
+            <a:r>
+              <a:rPr lang="en-US" sz="1000" dirty="0">
+                <a:solidFill>
+                  <a:schemeClr val="bg1">
+                    <a:lumMod val="50000"/>
+                  </a:schemeClr>
+                </a:solidFill>
+                <a:latin typeface="Bookman Old Style" panose="02050604050505020204" pitchFamily="18" charset="0"/>
+              </a:rPr>
+              <a:t>[16] H. Hung and C.-T. Chiang, Estimation methods for </a:t>
+            </a:r>
+            <a:r>
+              <a:rPr lang="en-US" sz="1000" dirty="0" err="1">
+                <a:solidFill>
+                  <a:schemeClr val="bg1">
+                    <a:lumMod val="50000"/>
+                  </a:schemeClr>
+                </a:solidFill>
+                <a:latin typeface="Bookman Old Style" panose="02050604050505020204" pitchFamily="18" charset="0"/>
+              </a:rPr>
+              <a:t>timedependent</a:t>
+            </a:r>
+            <a:r>
+              <a:rPr lang="en-US" sz="1000" dirty="0">
+                <a:solidFill>
+                  <a:schemeClr val="bg1">
+                    <a:lumMod val="50000"/>
+                  </a:schemeClr>
+                </a:solidFill>
+                <a:latin typeface="Bookman Old Style" panose="02050604050505020204" pitchFamily="18" charset="0"/>
+              </a:rPr>
+              <a:t> </a:t>
+            </a:r>
+            <a:r>
+              <a:rPr lang="en-US" sz="1000" dirty="0" err="1">
+                <a:solidFill>
+                  <a:schemeClr val="bg1">
+                    <a:lumMod val="50000"/>
+                  </a:schemeClr>
+                </a:solidFill>
+                <a:latin typeface="Bookman Old Style" panose="02050604050505020204" pitchFamily="18" charset="0"/>
+              </a:rPr>
+              <a:t>auc</a:t>
+            </a:r>
+            <a:r>
+              <a:rPr lang="en-US" sz="1000" dirty="0">
+                <a:solidFill>
+                  <a:schemeClr val="bg1">
+                    <a:lumMod val="50000"/>
+                  </a:schemeClr>
+                </a:solidFill>
+                <a:latin typeface="Bookman Old Style" panose="02050604050505020204" pitchFamily="18" charset="0"/>
+              </a:rPr>
+              <a:t> models with survival data., The Canadian Journal of Statistics / La Revue Canadienne de </a:t>
+            </a:r>
+            <a:r>
+              <a:rPr lang="en-US" sz="1000" dirty="0" err="1">
+                <a:solidFill>
+                  <a:schemeClr val="bg1">
+                    <a:lumMod val="50000"/>
+                  </a:schemeClr>
+                </a:solidFill>
+                <a:latin typeface="Bookman Old Style" panose="02050604050505020204" pitchFamily="18" charset="0"/>
+              </a:rPr>
+              <a:t>Statistique</a:t>
+            </a:r>
+            <a:r>
+              <a:rPr lang="en-US" sz="1000" dirty="0">
+                <a:solidFill>
+                  <a:schemeClr val="bg1">
+                    <a:lumMod val="50000"/>
+                  </a:schemeClr>
+                </a:solidFill>
+                <a:latin typeface="Bookman Old Style" panose="02050604050505020204" pitchFamily="18" charset="0"/>
+              </a:rPr>
+              <a:t> 38 (2010).</a:t>
+            </a:r>
+            <a:endParaRPr lang="en-GB" sz="1000" dirty="0">
+              <a:solidFill>
+                <a:schemeClr val="bg1">
+                  <a:lumMod val="50000"/>
+                </a:schemeClr>
+              </a:solidFill>
+              <a:latin typeface="Bookman Old Style" panose="02050604050505020204" pitchFamily="18" charset="0"/>
+            </a:endParaRPr>
+          </a:p>
+        </p:txBody>
+      </p:sp>
+      <p:sp>
+        <p:nvSpPr>
+          <p:cNvPr id="8" name="Rectangle 3">
+            <a:extLst>
+              <a:ext uri="{FF2B5EF4-FFF2-40B4-BE49-F238E27FC236}">
+                <a16:creationId xmlns:a16="http://schemas.microsoft.com/office/drawing/2014/main" id="{9BAAA419-B2B8-E317-CACF-71B42D724AF5}"/>
+              </a:ext>
+            </a:extLst>
+          </p:cNvPr>
+          <p:cNvSpPr>
+            <a:spLocks noChangeArrowheads="1"/>
+          </p:cNvSpPr>
+          <p:nvPr/>
+        </p:nvSpPr>
+        <p:spPr bwMode="auto">
+          <a:xfrm>
+            <a:off x="547141" y="1859342"/>
+            <a:ext cx="10768559" cy="3139321"/>
+          </a:xfrm>
+          <a:prstGeom prst="rect">
+            <a:avLst/>
+          </a:prstGeom>
+          <a:noFill/>
+          <a:ln>
+            <a:noFill/>
+          </a:ln>
+          <a:effectLst/>
+        </p:spPr>
+        <p:txBody>
+          <a:bodyPr vert="horz" wrap="square" lIns="91440" tIns="45720" rIns="91440" bIns="45720" numCol="1" anchor="ctr" anchorCtr="0" compatLnSpc="1">
+            <a:prstTxWarp prst="textNoShape">
+              <a:avLst/>
+            </a:prstTxWarp>
+            <a:spAutoFit/>
+          </a:bodyPr>
+          <a:lstStyle>
+            <a:lvl1pPr eaLnBrk="0" fontAlgn="base" hangingPunct="0">
+              <a:spcBef>
+                <a:spcPct val="0"/>
+              </a:spcBef>
+              <a:spcAft>
+                <a:spcPct val="0"/>
+              </a:spcAft>
+              <a:defRPr>
+                <a:solidFill>
+                  <a:schemeClr val="tx1"/>
+                </a:solidFill>
+                <a:latin typeface="Arial" panose="020B0604020202020204" pitchFamily="34" charset="0"/>
+              </a:defRPr>
+            </a:lvl1pPr>
+            <a:lvl2pPr eaLnBrk="0" fontAlgn="base" hangingPunct="0">
+              <a:spcBef>
+                <a:spcPct val="0"/>
+              </a:spcBef>
+              <a:spcAft>
+                <a:spcPct val="0"/>
+              </a:spcAft>
+              <a:defRPr>
+                <a:solidFill>
+                  <a:schemeClr val="tx1"/>
+                </a:solidFill>
+                <a:latin typeface="Arial" panose="020B0604020202020204" pitchFamily="34" charset="0"/>
+              </a:defRPr>
+            </a:lvl2pPr>
+            <a:lvl3pPr eaLnBrk="0" fontAlgn="base" hangingPunct="0">
+              <a:spcBef>
+                <a:spcPct val="0"/>
+              </a:spcBef>
+              <a:spcAft>
+                <a:spcPct val="0"/>
+              </a:spcAft>
+              <a:defRPr>
+                <a:solidFill>
+                  <a:schemeClr val="tx1"/>
+                </a:solidFill>
+                <a:latin typeface="Arial" panose="020B0604020202020204" pitchFamily="34" charset="0"/>
+              </a:defRPr>
+            </a:lvl3pPr>
+            <a:lvl4pPr eaLnBrk="0" fontAlgn="base" hangingPunct="0">
+              <a:spcBef>
+                <a:spcPct val="0"/>
+              </a:spcBef>
+              <a:spcAft>
+                <a:spcPct val="0"/>
+              </a:spcAft>
+              <a:defRPr>
+                <a:solidFill>
+                  <a:schemeClr val="tx1"/>
+                </a:solidFill>
+                <a:latin typeface="Arial" panose="020B0604020202020204" pitchFamily="34" charset="0"/>
+              </a:defRPr>
+            </a:lvl4pPr>
+            <a:lvl5pPr eaLnBrk="0" fontAlgn="base" hangingPunct="0">
+              <a:spcBef>
+                <a:spcPct val="0"/>
+              </a:spcBef>
+              <a:spcAft>
+                <a:spcPct val="0"/>
+              </a:spcAft>
+              <a:defRPr>
+                <a:solidFill>
+                  <a:schemeClr val="tx1"/>
+                </a:solidFill>
+                <a:latin typeface="Arial" panose="020B0604020202020204" pitchFamily="34" charset="0"/>
+              </a:defRPr>
+            </a:lvl5pPr>
+            <a:lvl6pPr eaLnBrk="0" fontAlgn="base" hangingPunct="0">
+              <a:spcBef>
+                <a:spcPct val="0"/>
+              </a:spcBef>
+              <a:spcAft>
+                <a:spcPct val="0"/>
+              </a:spcAft>
+              <a:defRPr>
+                <a:solidFill>
+                  <a:schemeClr val="tx1"/>
+                </a:solidFill>
+                <a:latin typeface="Arial" panose="020B0604020202020204" pitchFamily="34" charset="0"/>
+              </a:defRPr>
+            </a:lvl6pPr>
+            <a:lvl7pPr eaLnBrk="0" fontAlgn="base" hangingPunct="0">
+              <a:spcBef>
+                <a:spcPct val="0"/>
+              </a:spcBef>
+              <a:spcAft>
+                <a:spcPct val="0"/>
+              </a:spcAft>
+              <a:defRPr>
+                <a:solidFill>
+                  <a:schemeClr val="tx1"/>
+                </a:solidFill>
+                <a:latin typeface="Arial" panose="020B0604020202020204" pitchFamily="34" charset="0"/>
+              </a:defRPr>
+            </a:lvl7pPr>
+            <a:lvl8pPr eaLnBrk="0" fontAlgn="base" hangingPunct="0">
+              <a:spcBef>
+                <a:spcPct val="0"/>
+              </a:spcBef>
+              <a:spcAft>
+                <a:spcPct val="0"/>
+              </a:spcAft>
+              <a:defRPr>
+                <a:solidFill>
+                  <a:schemeClr val="tx1"/>
+                </a:solidFill>
+                <a:latin typeface="Arial" panose="020B0604020202020204" pitchFamily="34" charset="0"/>
+              </a:defRPr>
+            </a:lvl8pPr>
+            <a:lvl9pPr eaLnBrk="0" fontAlgn="base" hangingPunct="0">
+              <a:spcBef>
+                <a:spcPct val="0"/>
+              </a:spcBef>
+              <a:spcAft>
+                <a:spcPct val="0"/>
+              </a:spcAft>
+              <a:defRPr>
+                <a:solidFill>
+                  <a:schemeClr val="tx1"/>
+                </a:solidFill>
+                <a:latin typeface="Arial" panose="020B0604020202020204" pitchFamily="34" charset="0"/>
+              </a:defRPr>
+            </a:lvl9pPr>
+          </a:lstStyle>
+          <a:p>
+            <a:pPr algn="just"/>
+            <a:r>
+              <a:rPr lang="en-US" b="0" i="0" dirty="0">
+                <a:solidFill>
+                  <a:schemeClr val="bg1"/>
+                </a:solidFill>
+                <a:effectLst/>
+                <a:latin typeface="Bookman Old Style" panose="02050604050505020204" pitchFamily="18" charset="0"/>
+              </a:rPr>
+              <a:t>Both the time-invariant and time-varying architectures lead to higher discriminative power in </a:t>
+            </a:r>
+            <a:r>
+              <a:rPr lang="en-US" b="0" i="0" dirty="0" err="1">
+                <a:solidFill>
+                  <a:schemeClr val="bg1"/>
+                </a:solidFill>
+                <a:effectLst/>
+                <a:latin typeface="Bookman Old Style" panose="02050604050505020204" pitchFamily="18" charset="0"/>
+              </a:rPr>
+              <a:t>favour</a:t>
+            </a:r>
+            <a:r>
+              <a:rPr lang="en-US" b="0" i="0" dirty="0">
+                <a:solidFill>
+                  <a:schemeClr val="bg1"/>
+                </a:solidFill>
+                <a:effectLst/>
+                <a:latin typeface="Bookman Old Style" panose="02050604050505020204" pitchFamily="18" charset="0"/>
+              </a:rPr>
+              <a:t> of worse calibration. For these to be applied in a clinical setting, the choice of which metric to prioritize needs to be carefully considered.</a:t>
+            </a:r>
+          </a:p>
+          <a:p>
+            <a:pPr algn="just"/>
+            <a:endParaRPr lang="en-US" dirty="0">
+              <a:solidFill>
+                <a:schemeClr val="bg1"/>
+              </a:solidFill>
+              <a:latin typeface="Bookman Old Style" panose="02050604050505020204" pitchFamily="18" charset="0"/>
+            </a:endParaRPr>
+          </a:p>
+          <a:p>
+            <a:pPr algn="just"/>
+            <a:r>
+              <a:rPr lang="en-US" b="0" i="0" dirty="0">
+                <a:solidFill>
+                  <a:schemeClr val="bg1"/>
+                </a:solidFill>
+                <a:effectLst/>
+                <a:latin typeface="Bookman Old Style" panose="02050604050505020204" pitchFamily="18" charset="0"/>
+              </a:rPr>
+              <a:t>Additionally, in the realm of neural networks and big data, training time and selective hyperparameter tuning are important. While deep learning can compete with (and outperform) traditional survival analysis, achieving optimal results requires meticulous hyperparameter tuning and sufficient training duration.</a:t>
+            </a:r>
+          </a:p>
+          <a:p>
+            <a:pPr algn="just"/>
+            <a:endParaRPr lang="en-US" dirty="0">
+              <a:solidFill>
+                <a:schemeClr val="bg1"/>
+              </a:solidFill>
+              <a:latin typeface="Bookman Old Style" panose="02050604050505020204" pitchFamily="18" charset="0"/>
+            </a:endParaRPr>
+          </a:p>
+          <a:p>
+            <a:pPr algn="just"/>
+            <a:r>
+              <a:rPr lang="en-US" b="0" i="0" dirty="0">
+                <a:solidFill>
+                  <a:schemeClr val="bg1"/>
+                </a:solidFill>
+                <a:effectLst/>
+                <a:latin typeface="Bookman Old Style" panose="02050604050505020204" pitchFamily="18" charset="0"/>
+              </a:rPr>
+              <a:t>Nonetheless, the relationship between training time and improved performance is not always linear, highlighting the need for careful evaluation.</a:t>
+            </a:r>
+          </a:p>
+        </p:txBody>
+      </p:sp>
+    </p:spTree>
+    <p:extLst>
+      <p:ext uri="{BB962C8B-B14F-4D97-AF65-F5344CB8AC3E}">
+        <p14:creationId xmlns:p14="http://schemas.microsoft.com/office/powerpoint/2010/main" val="2609001791"/>
+      </p:ext>
+    </p:extLst>
+  </p:cSld>
+  <p:clrMapOvr>
+    <a:masterClrMapping/>
+  </p:clrMapOvr>
+</p:sld>
+</file>
+
+<file path=ppt/slides/slide15.xml><?xml version="1.0" encoding="utf-8"?>
+<p:sld xmlns:a="http://schemas.openxmlformats.org/drawingml/2006/main" xmlns:r="http://schemas.openxmlformats.org/officeDocument/2006/relationships" xmlns:p="http://schemas.openxmlformats.org/presentationml/2006/main">
+  <p:cSld>
+    <p:spTree>
+      <p:nvGrpSpPr>
+        <p:cNvPr id="1" name=""/>
+        <p:cNvGrpSpPr/>
+        <p:nvPr/>
+      </p:nvGrpSpPr>
+      <p:grpSpPr>
+        <a:xfrm>
+          <a:off x="0" y="0"/>
+          <a:ext cx="0" cy="0"/>
+          <a:chOff x="0" y="0"/>
+          <a:chExt cx="0" cy="0"/>
+        </a:xfrm>
+      </p:grpSpPr>
+      <p:sp>
+        <p:nvSpPr>
+          <p:cNvPr id="3" name="TextBox 2">
+            <a:extLst>
+              <a:ext uri="{FF2B5EF4-FFF2-40B4-BE49-F238E27FC236}">
+                <a16:creationId xmlns:a16="http://schemas.microsoft.com/office/drawing/2014/main" id="{0E725062-F380-C772-0084-0A280BF5775E}"/>
+              </a:ext>
+            </a:extLst>
+          </p:cNvPr>
+          <p:cNvSpPr txBox="1"/>
+          <p:nvPr/>
+        </p:nvSpPr>
+        <p:spPr>
+          <a:xfrm>
+            <a:off x="547141" y="520597"/>
+            <a:ext cx="8881672" cy="584775"/>
+          </a:xfrm>
+          <a:prstGeom prst="rect">
+            <a:avLst/>
+          </a:prstGeom>
+          <a:noFill/>
+        </p:spPr>
+        <p:txBody>
+          <a:bodyPr wrap="square" rtlCol="0">
+            <a:spAutoFit/>
+          </a:bodyPr>
+          <a:lstStyle/>
+          <a:p>
+            <a:r>
+              <a:rPr lang="en-US" sz="3200" dirty="0">
+                <a:solidFill>
+                  <a:schemeClr val="bg1"/>
+                </a:solidFill>
+                <a:latin typeface="Bookman Old Style" panose="02050604050505020204" pitchFamily="18" charset="0"/>
+              </a:rPr>
               <a:t>Thank you for watching!</a:t>
             </a:r>
           </a:p>
@@ -9269,7 +9874,7 @@
 </p:sld>
 </file>
 
-<file path=ppt/slides/slide15.xml><?xml version="1.0" encoding="utf-8"?>
+<file path=ppt/slides/slide16.xml><?xml version="1.0" encoding="utf-8"?>
 <p:sld xmlns:a="http://schemas.openxmlformats.org/drawingml/2006/main" xmlns:r="http://schemas.openxmlformats.org/officeDocument/2006/relationships" xmlns:p="http://schemas.openxmlformats.org/presentationml/2006/main" show="0">
   <p:cSld>
     <p:spTree>
@@ -9637,7 +10242,7 @@
         <p:spPr>
           <a:xfrm>
             <a:off x="1655164" y="1982450"/>
-            <a:ext cx="8881672" cy="2800767"/>
+            <a:ext cx="8881672" cy="2554545"/>
           </a:xfrm>
           <a:prstGeom prst="rect">
             <a:avLst/>
@@ -9782,21 +10387,6 @@
                 <a:latin typeface="Bookman Old Style" panose="02050604050505020204" pitchFamily="18" charset="0"/>
               </a:rPr>
               <a:t>Results</a:t>
-            </a:r>
-          </a:p>
-          <a:p>
-            <a:pPr marL="971550" lvl="1" indent="-514350">
-              <a:buFont typeface="+mj-lt"/>
-              <a:buAutoNum type="romanLcPeriod"/>
-            </a:pPr>
-            <a:r>
-              <a:rPr lang="en-US" sz="1600" dirty="0">
-                <a:solidFill>
-                  <a:schemeClr val="bg1"/>
-                </a:solidFill>
-                <a:latin typeface="Bookman Old Style" panose="02050604050505020204" pitchFamily="18" charset="0"/>
-              </a:rPr>
-              <a:t>Additional Findings</a:t>
             </a:r>
           </a:p>
           <a:p>
@@ -10479,7 +11069,7 @@
                 </a:solidFill>
                 <a:latin typeface="Bookman Old Style" panose="02050604050505020204" pitchFamily="18" charset="0"/>
               </a:rPr>
-              <a:t>Background</a:t>
+              <a:t>Background – Survival Analysis</a:t>
             </a:r>
           </a:p>
         </p:txBody>
@@ -26011,6 +26601,49 @@
           </a:graphicData>
         </a:graphic>
       </p:graphicFrame>
+      <p:sp>
+        <p:nvSpPr>
+          <p:cNvPr id="5" name="TextBox 4">
+            <a:extLst>
+              <a:ext uri="{FF2B5EF4-FFF2-40B4-BE49-F238E27FC236}">
+                <a16:creationId xmlns:a16="http://schemas.microsoft.com/office/drawing/2014/main" id="{66E9E682-7BAF-DFAA-853E-E7A9098EB7F2}"/>
+              </a:ext>
+            </a:extLst>
+          </p:cNvPr>
+          <p:cNvSpPr txBox="1"/>
+          <p:nvPr/>
+        </p:nvSpPr>
+        <p:spPr>
+          <a:xfrm>
+            <a:off x="7455493" y="122255"/>
+            <a:ext cx="4736507" cy="261610"/>
+          </a:xfrm>
+          <a:prstGeom prst="rect">
+            <a:avLst/>
+          </a:prstGeom>
+          <a:noFill/>
+        </p:spPr>
+        <p:txBody>
+          <a:bodyPr wrap="square">
+            <a:spAutoFit/>
+          </a:bodyPr>
+          <a:lstStyle/>
+          <a:p>
+            <a:pPr algn="ctr"/>
+            <a:r>
+              <a:rPr lang="en-US" sz="1100" dirty="0">
+                <a:solidFill>
+                  <a:schemeClr val="bg1">
+                    <a:lumMod val="50000"/>
+                  </a:schemeClr>
+                </a:solidFill>
+                <a:latin typeface="Bookman Old Style" panose="02050604050505020204" pitchFamily="18" charset="0"/>
+              </a:rPr>
+              <a:t>Results are subject to slight change in final submission of report</a:t>
+            </a:r>
+          </a:p>
+        </p:txBody>
+      </p:sp>
     </p:spTree>
     <p:extLst>
       <p:ext uri="{BB962C8B-B14F-4D97-AF65-F5344CB8AC3E}">
@@ -26220,6 +26853,49 @@
               <a:t> with Logistic Hazards</a:t>
             </a:r>
             <a:endParaRPr lang="en-GB" sz="1050" dirty="0"/>
+          </a:p>
+        </p:txBody>
+      </p:sp>
+      <p:sp>
+        <p:nvSpPr>
+          <p:cNvPr id="4" name="TextBox 3">
+            <a:extLst>
+              <a:ext uri="{FF2B5EF4-FFF2-40B4-BE49-F238E27FC236}">
+                <a16:creationId xmlns:a16="http://schemas.microsoft.com/office/drawing/2014/main" id="{5FB2B426-2222-A9C4-1CED-7462F972C056}"/>
+              </a:ext>
+            </a:extLst>
+          </p:cNvPr>
+          <p:cNvSpPr txBox="1"/>
+          <p:nvPr/>
+        </p:nvSpPr>
+        <p:spPr>
+          <a:xfrm>
+            <a:off x="7455493" y="122255"/>
+            <a:ext cx="4736507" cy="261610"/>
+          </a:xfrm>
+          <a:prstGeom prst="rect">
+            <a:avLst/>
+          </a:prstGeom>
+          <a:noFill/>
+        </p:spPr>
+        <p:txBody>
+          <a:bodyPr wrap="square">
+            <a:spAutoFit/>
+          </a:bodyPr>
+          <a:lstStyle/>
+          <a:p>
+            <a:pPr algn="ctr"/>
+            <a:r>
+              <a:rPr lang="en-US" sz="1100" dirty="0">
+                <a:solidFill>
+                  <a:schemeClr val="bg1">
+                    <a:lumMod val="50000"/>
+                  </a:schemeClr>
+                </a:solidFill>
+                <a:latin typeface="Bookman Old Style" panose="02050604050505020204" pitchFamily="18" charset="0"/>
+              </a:rPr>
+              <a:t>Results are subject to slight change in final submission of report</a:t>
+            </a:r>
           </a:p>
         </p:txBody>
       </p:sp>

</xml_diff>

<commit_message>
morning of final prsnttn submission
</commit_message>
<xml_diff>
--- a/presentations/powerpoint_presentation/my_presentation.pptx
+++ b/presentations/powerpoint_presentation/my_presentation.pptx
@@ -9842,10 +9842,10 @@
       </p:sp>
       <p:sp>
         <p:nvSpPr>
-          <p:cNvPr id="9" name="TextBox 8">
+          <p:cNvPr id="5" name="TextBox 4">
             <a:extLst>
               <a:ext uri="{FF2B5EF4-FFF2-40B4-BE49-F238E27FC236}">
-                <a16:creationId xmlns:a16="http://schemas.microsoft.com/office/drawing/2014/main" id="{05CBF40A-55E8-7F6A-9969-8DE5A580DF13}"/>
+                <a16:creationId xmlns:a16="http://schemas.microsoft.com/office/drawing/2014/main" id="{0F5E582A-BE22-7216-CB0C-3CDD145D3D79}"/>
               </a:ext>
             </a:extLst>
           </p:cNvPr>
@@ -9854,8 +9854,8 @@
         </p:nvSpPr>
         <p:spPr>
           <a:xfrm>
-            <a:off x="547141" y="1279056"/>
-            <a:ext cx="6097136" cy="369332"/>
+            <a:off x="547141" y="1386217"/>
+            <a:ext cx="6097136" cy="646331"/>
           </a:xfrm>
           <a:prstGeom prst="rect">
             <a:avLst/>
@@ -9871,10 +9871,7 @@
             <a:r>
               <a:rPr lang="en-GB" dirty="0">
                 <a:solidFill>
-                  <a:schemeClr val="accent1">
-                    <a:lumMod val="60000"/>
-                    <a:lumOff val="40000"/>
-                  </a:schemeClr>
+                  <a:schemeClr val="accent2"/>
                 </a:solidFill>
                 <a:latin typeface="Bookman Old Style" panose="02050604050505020204" pitchFamily="18" charset="0"/>
                 <a:hlinkClick r:id="rId2">
@@ -9885,14 +9882,11 @@
                   </a:extLst>
                 </a:hlinkClick>
               </a:rPr>
-              <a:t>Presentation_Recording_ss1474.mp4</a:t>
+              <a:t>Dissertation_Presentation-20230811_105634-Meeting Recording.mp4</a:t>
             </a:r>
             <a:endParaRPr lang="en-GB" dirty="0">
               <a:solidFill>
-                <a:schemeClr val="accent1">
-                  <a:lumMod val="60000"/>
-                  <a:lumOff val="40000"/>
-                </a:schemeClr>
+                <a:schemeClr val="accent2"/>
               </a:solidFill>
               <a:latin typeface="Bookman Old Style" panose="02050604050505020204" pitchFamily="18" charset="0"/>
             </a:endParaRPr>

</xml_diff>